<commit_message>
Add variable as number array
</commit_message>
<xml_diff>
--- a/docs/MATH - EVALUATOR - 2a Iteração.pptx
+++ b/docs/MATH - EVALUATOR - 2a Iteração.pptx
@@ -4108,7 +4108,7 @@
             <a:fld id="{B61BEF0D-F0BB-DE4B-95CE-6DB70DBA9567}" type="datetimeFigureOut">
               <a:rPr lang="en-US" dirty="0"/>
               <a:pPr/>
-              <a:t>11/29/2016</a:t>
+              <a:t>11/30/2016</a:t>
             </a:fld>
             <a:endParaRPr lang="en-US" dirty="0"/>
           </a:p>
@@ -4401,7 +4401,7 @@
             <a:fld id="{B61BEF0D-F0BB-DE4B-95CE-6DB70DBA9567}" type="datetimeFigureOut">
               <a:rPr lang="en-US" dirty="0"/>
               <a:pPr/>
-              <a:t>11/29/2016</a:t>
+              <a:t>11/30/2016</a:t>
             </a:fld>
             <a:endParaRPr lang="en-US" dirty="0"/>
           </a:p>
@@ -4646,7 +4646,7 @@
             <a:fld id="{B61BEF0D-F0BB-DE4B-95CE-6DB70DBA9567}" type="datetimeFigureOut">
               <a:rPr lang="en-US" dirty="0"/>
               <a:pPr/>
-              <a:t>11/29/2016</a:t>
+              <a:t>11/30/2016</a:t>
             </a:fld>
             <a:endParaRPr lang="en-US" dirty="0"/>
           </a:p>
@@ -5183,7 +5183,7 @@
             <a:fld id="{B61BEF0D-F0BB-DE4B-95CE-6DB70DBA9567}" type="datetimeFigureOut">
               <a:rPr lang="en-US" dirty="0"/>
               <a:pPr/>
-              <a:t>11/29/2016</a:t>
+              <a:t>11/30/2016</a:t>
             </a:fld>
             <a:endParaRPr lang="en-US" dirty="0"/>
           </a:p>
@@ -5428,7 +5428,7 @@
             <a:fld id="{B61BEF0D-F0BB-DE4B-95CE-6DB70DBA9567}" type="datetimeFigureOut">
               <a:rPr lang="en-US" dirty="0"/>
               <a:pPr/>
-              <a:t>11/29/2016</a:t>
+              <a:t>11/30/2016</a:t>
             </a:fld>
             <a:endParaRPr lang="en-US" dirty="0"/>
           </a:p>
@@ -5957,7 +5957,7 @@
             <a:fld id="{B61BEF0D-F0BB-DE4B-95CE-6DB70DBA9567}" type="datetimeFigureOut">
               <a:rPr lang="en-US" dirty="0"/>
               <a:pPr/>
-              <a:t>11/29/2016</a:t>
+              <a:t>11/30/2016</a:t>
             </a:fld>
             <a:endParaRPr lang="en-US" dirty="0"/>
           </a:p>
@@ -6251,7 +6251,7 @@
             <a:fld id="{B61BEF0D-F0BB-DE4B-95CE-6DB70DBA9567}" type="datetimeFigureOut">
               <a:rPr lang="en-US" dirty="0"/>
               <a:pPr/>
-              <a:t>11/29/2016</a:t>
+              <a:t>11/30/2016</a:t>
             </a:fld>
             <a:endParaRPr lang="en-US" dirty="0"/>
           </a:p>
@@ -6422,7 +6422,7 @@
             <a:fld id="{B61BEF0D-F0BB-DE4B-95CE-6DB70DBA9567}" type="datetimeFigureOut">
               <a:rPr lang="en-US" dirty="0"/>
               <a:pPr/>
-              <a:t>11/29/2016</a:t>
+              <a:t>11/30/2016</a:t>
             </a:fld>
             <a:endParaRPr lang="en-US" dirty="0"/>
           </a:p>
@@ -6599,7 +6599,7 @@
             <a:fld id="{B61BEF0D-F0BB-DE4B-95CE-6DB70DBA9567}" type="datetimeFigureOut">
               <a:rPr lang="en-US" dirty="0"/>
               <a:pPr/>
-              <a:t>11/29/2016</a:t>
+              <a:t>11/30/2016</a:t>
             </a:fld>
             <a:endParaRPr lang="en-US" dirty="0"/>
           </a:p>
@@ -6766,7 +6766,7 @@
             <a:fld id="{B61BEF0D-F0BB-DE4B-95CE-6DB70DBA9567}" type="datetimeFigureOut">
               <a:rPr lang="en-US" dirty="0"/>
               <a:pPr/>
-              <a:t>11/29/2016</a:t>
+              <a:t>11/30/2016</a:t>
             </a:fld>
             <a:endParaRPr lang="en-US" dirty="0"/>
           </a:p>
@@ -7014,7 +7014,7 @@
             <a:fld id="{B61BEF0D-F0BB-DE4B-95CE-6DB70DBA9567}" type="datetimeFigureOut">
               <a:rPr lang="en-US" dirty="0"/>
               <a:pPr/>
-              <a:t>11/29/2016</a:t>
+              <a:t>11/30/2016</a:t>
             </a:fld>
             <a:endParaRPr lang="en-US" dirty="0"/>
           </a:p>
@@ -7308,7 +7308,7 @@
             <a:fld id="{B61BEF0D-F0BB-DE4B-95CE-6DB70DBA9567}" type="datetimeFigureOut">
               <a:rPr lang="en-US" dirty="0"/>
               <a:pPr/>
-              <a:t>11/29/2016</a:t>
+              <a:t>11/30/2016</a:t>
             </a:fld>
             <a:endParaRPr lang="en-US" dirty="0"/>
           </a:p>
@@ -7747,7 +7747,7 @@
             <a:fld id="{B61BEF0D-F0BB-DE4B-95CE-6DB70DBA9567}" type="datetimeFigureOut">
               <a:rPr lang="en-US" dirty="0"/>
               <a:pPr/>
-              <a:t>11/29/2016</a:t>
+              <a:t>11/30/2016</a:t>
             </a:fld>
             <a:endParaRPr lang="en-US" dirty="0"/>
           </a:p>
@@ -7862,7 +7862,7 @@
             <a:fld id="{B61BEF0D-F0BB-DE4B-95CE-6DB70DBA9567}" type="datetimeFigureOut">
               <a:rPr lang="en-US" dirty="0"/>
               <a:pPr/>
-              <a:t>11/29/2016</a:t>
+              <a:t>11/30/2016</a:t>
             </a:fld>
             <a:endParaRPr lang="en-US" dirty="0"/>
           </a:p>
@@ -7954,7 +7954,7 @@
             <a:fld id="{B61BEF0D-F0BB-DE4B-95CE-6DB70DBA9567}" type="datetimeFigureOut">
               <a:rPr lang="en-US" dirty="0"/>
               <a:pPr/>
-              <a:t>11/29/2016</a:t>
+              <a:t>11/30/2016</a:t>
             </a:fld>
             <a:endParaRPr lang="en-US" dirty="0"/>
           </a:p>
@@ -8234,7 +8234,7 @@
             <a:fld id="{B61BEF0D-F0BB-DE4B-95CE-6DB70DBA9567}" type="datetimeFigureOut">
               <a:rPr lang="en-US" dirty="0"/>
               <a:pPr/>
-              <a:t>11/29/2016</a:t>
+              <a:t>11/30/2016</a:t>
             </a:fld>
             <a:endParaRPr lang="en-US" dirty="0"/>
           </a:p>
@@ -8522,7 +8522,7 @@
             <a:fld id="{B61BEF0D-F0BB-DE4B-95CE-6DB70DBA9567}" type="datetimeFigureOut">
               <a:rPr lang="en-US" dirty="0"/>
               <a:pPr/>
-              <a:t>11/29/2016</a:t>
+              <a:t>11/30/2016</a:t>
             </a:fld>
             <a:endParaRPr lang="en-US" dirty="0"/>
           </a:p>
@@ -9049,7 +9049,7 @@
             <a:fld id="{B61BEF0D-F0BB-DE4B-95CE-6DB70DBA9567}" type="datetimeFigureOut">
               <a:rPr lang="en-US" dirty="0"/>
               <a:pPr/>
-              <a:t>11/29/2016</a:t>
+              <a:t>11/30/2016</a:t>
             </a:fld>
             <a:endParaRPr lang="en-US" dirty="0"/>
           </a:p>
@@ -9930,11 +9930,7 @@
             </a:r>
             <a:r>
               <a:rPr lang="pt-BR" sz="2400" dirty="0" smtClean="0"/>
-              <a:t> </a:t>
-            </a:r>
-            <a:r>
-              <a:rPr lang="pt-BR" sz="2400" dirty="0" smtClean="0"/>
-              <a:t>= (-b + </a:t>
+              <a:t> = (-b + </a:t>
             </a:r>
             <a:r>
               <a:rPr lang="pt-BR" sz="2400" dirty="0" err="1" smtClean="0"/>
@@ -9942,11 +9938,7 @@
             </a:r>
             <a:r>
               <a:rPr lang="pt-BR" sz="2400" dirty="0" smtClean="0"/>
-              <a:t>(b^2 – 4 *a*c))/(2*a</a:t>
-            </a:r>
-            <a:r>
-              <a:rPr lang="pt-BR" sz="2400" dirty="0" smtClean="0"/>
-              <a:t>)</a:t>
+              <a:t>(b^2 – 4 *a*c))/(2*a)</a:t>
             </a:r>
             <a:br>
               <a:rPr lang="pt-BR" sz="2400" dirty="0" smtClean="0"/>
@@ -9971,61 +9963,6 @@
               <a:t>)</a:t>
             </a:r>
             <a:endParaRPr lang="pt-BR" sz="2400" dirty="0"/>
-          </a:p>
-        </p:txBody>
-      </p:sp>
-      <p:sp>
-        <p:nvSpPr>
-          <p:cNvPr id="3" name="Texto explicativo retangular 2"/>
-          <p:cNvSpPr/>
-          <p:nvPr/>
-        </p:nvSpPr>
-        <p:spPr>
-          <a:xfrm>
-            <a:off x="8538693" y="2210871"/>
-            <a:ext cx="2846231" cy="875763"/>
-          </a:xfrm>
-          <a:prstGeom prst="wedgeRectCallout">
-            <a:avLst>
-              <a:gd name="adj1" fmla="val -29883"/>
-              <a:gd name="adj2" fmla="val -106316"/>
-            </a:avLst>
-          </a:prstGeom>
-        </p:spPr>
-        <p:style>
-          <a:lnRef idx="2">
-            <a:schemeClr val="accent1">
-              <a:shade val="50000"/>
-            </a:schemeClr>
-          </a:lnRef>
-          <a:fillRef idx="1">
-            <a:schemeClr val="accent1"/>
-          </a:fillRef>
-          <a:effectRef idx="0">
-            <a:schemeClr val="accent1"/>
-          </a:effectRef>
-          <a:fontRef idx="minor">
-            <a:schemeClr val="lt1"/>
-          </a:fontRef>
-        </p:style>
-        <p:txBody>
-          <a:bodyPr rtlCol="0" anchor="ctr"/>
-          <a:lstStyle/>
-          <a:p>
-            <a:pPr algn="ctr"/>
-            <a:r>
-              <a:rPr lang="pt-BR" dirty="0" smtClean="0"/>
-              <a:t>As operações com </a:t>
-            </a:r>
-            <a:r>
-              <a:rPr lang="pt-BR" dirty="0" err="1" smtClean="0"/>
-              <a:t>arrays</a:t>
-            </a:r>
-            <a:r>
-              <a:rPr lang="pt-BR" dirty="0" smtClean="0"/>
-              <a:t> podem ser realizadas através de várias chamadas</a:t>
-            </a:r>
-            <a:endParaRPr lang="pt-BR" dirty="0"/>
           </a:p>
         </p:txBody>
       </p:sp>
@@ -10088,7 +10025,7 @@
           <a:p>
             <a:r>
               <a:rPr lang="pt-BR" dirty="0" smtClean="0"/>
-              <a:t>O que foi feito a mais ?</a:t>
+              <a:t>Refatoração necessária</a:t>
             </a:r>
             <a:endParaRPr lang="pt-BR" dirty="0"/>
           </a:p>
@@ -10595,12 +10532,14 @@
           </a:xfrm>
         </p:spPr>
         <p:txBody>
-          <a:bodyPr/>
+          <a:bodyPr>
+            <a:normAutofit/>
+          </a:bodyPr>
           <a:lstStyle/>
           <a:p>
             <a:r>
               <a:rPr lang="pt-BR" dirty="0" smtClean="0"/>
-              <a:t>O que foi feito a mais ?</a:t>
+              <a:t>Recurso para processamento de fórmulas </a:t>
             </a:r>
             <a:endParaRPr lang="pt-BR" dirty="0"/>
           </a:p>
@@ -10643,39 +10582,7 @@
                 <a:ea typeface="Calibri" panose="020F0502020204030204" pitchFamily="34" charset="0"/>
                 <a:cs typeface="Times New Roman" panose="02020603050405020304" pitchFamily="18" charset="0"/>
               </a:rPr>
-              <a:t>O </a:t>
-            </a:r>
-            <a:r>
-              <a:rPr lang="pt-BR" dirty="0" err="1" smtClean="0">
-                <a:latin typeface="Calibri" panose="020F0502020204030204" pitchFamily="34" charset="0"/>
-                <a:ea typeface="Calibri" panose="020F0502020204030204" pitchFamily="34" charset="0"/>
-                <a:cs typeface="Times New Roman" panose="02020603050405020304" pitchFamily="18" charset="0"/>
-              </a:rPr>
-              <a:t>Math</a:t>
-            </a:r>
-            <a:r>
-              <a:rPr lang="pt-BR" dirty="0" err="1" smtClean="0">
-                <a:latin typeface="Calibri" panose="020F0502020204030204" pitchFamily="34" charset="0"/>
-                <a:ea typeface="Calibri" panose="020F0502020204030204" pitchFamily="34" charset="0"/>
-                <a:cs typeface="Times New Roman" panose="02020603050405020304" pitchFamily="18" charset="0"/>
-              </a:rPr>
-              <a:t>Evaluator</a:t>
-            </a:r>
-            <a:r>
-              <a:rPr lang="pt-BR" dirty="0" smtClean="0">
-                <a:latin typeface="Calibri" panose="020F0502020204030204" pitchFamily="34" charset="0"/>
-                <a:ea typeface="Calibri" panose="020F0502020204030204" pitchFamily="34" charset="0"/>
-                <a:cs typeface="Times New Roman" panose="02020603050405020304" pitchFamily="18" charset="0"/>
-              </a:rPr>
-              <a:t> permite variável como fórmula</a:t>
-            </a:r>
-            <a:r>
-              <a:rPr lang="pt-BR" dirty="0" smtClean="0">
-                <a:latin typeface="Calibri" panose="020F0502020204030204" pitchFamily="34" charset="0"/>
-                <a:ea typeface="Calibri" panose="020F0502020204030204" pitchFamily="34" charset="0"/>
-                <a:cs typeface="Times New Roman" panose="02020603050405020304" pitchFamily="18" charset="0"/>
-              </a:rPr>
-              <a:t>. Exemplo:</a:t>
+              <a:t>O MathEvaluator permite variável como fórmula. Exemplo:</a:t>
             </a:r>
           </a:p>
           <a:p>
@@ -10886,7 +10793,7 @@
         <p:spPr>
           <a:xfrm>
             <a:off x="1775289" y="841433"/>
-            <a:ext cx="9720088" cy="338554"/>
+            <a:ext cx="9720088" cy="707886"/>
           </a:xfrm>
           <a:prstGeom prst="rect">
             <a:avLst/>
@@ -10899,7 +10806,7 @@
           <a:lstStyle/>
           <a:p>
             <a:r>
-              <a:rPr lang="pt-BR" sz="1600" dirty="0" smtClean="0">
+              <a:rPr lang="pt-BR" sz="2000" dirty="0" smtClean="0">
                 <a:latin typeface="Calibri" panose="020F0502020204030204" pitchFamily="34" charset="0"/>
                 <a:ea typeface="Calibri" panose="020F0502020204030204" pitchFamily="34" charset="0"/>
                 <a:cs typeface="Times New Roman" panose="02020603050405020304" pitchFamily="18" charset="0"/>
@@ -10907,7 +10814,7 @@
               <a:t>Na </a:t>
             </a:r>
             <a:r>
-              <a:rPr lang="pt-BR" sz="1600" b="1" dirty="0">
+              <a:rPr lang="pt-BR" sz="2000" b="1" dirty="0">
                 <a:latin typeface="Calibri" panose="020F0502020204030204" pitchFamily="34" charset="0"/>
                 <a:ea typeface="Calibri" panose="020F0502020204030204" pitchFamily="34" charset="0"/>
                 <a:cs typeface="Times New Roman" panose="02020603050405020304" pitchFamily="18" charset="0"/>
@@ -10915,7 +10822,7 @@
               <a:t>terceira iteração</a:t>
             </a:r>
             <a:r>
-              <a:rPr lang="pt-BR" sz="1600" dirty="0">
+              <a:rPr lang="pt-BR" sz="2000" dirty="0">
                 <a:latin typeface="Calibri" panose="020F0502020204030204" pitchFamily="34" charset="0"/>
                 <a:ea typeface="Calibri" panose="020F0502020204030204" pitchFamily="34" charset="0"/>
                 <a:cs typeface="Times New Roman" panose="02020603050405020304" pitchFamily="18" charset="0"/>
@@ -10923,7 +10830,7 @@
               <a:t> serão realizados a interpretação de operadores em Unicode, </a:t>
             </a:r>
             <a:r>
-              <a:rPr lang="pt-BR" sz="1600" u="sng" dirty="0" err="1">
+              <a:rPr lang="pt-BR" sz="2000" u="sng" dirty="0" err="1">
                 <a:latin typeface="Calibri" panose="020F0502020204030204" pitchFamily="34" charset="0"/>
                 <a:ea typeface="Calibri" panose="020F0502020204030204" pitchFamily="34" charset="0"/>
                 <a:cs typeface="Times New Roman" panose="02020603050405020304" pitchFamily="18" charset="0"/>
@@ -10931,7 +10838,7 @@
               <a:t>Latex</a:t>
             </a:r>
             <a:r>
-              <a:rPr lang="pt-BR" sz="1600" dirty="0">
+              <a:rPr lang="pt-BR" sz="2000" dirty="0">
                 <a:latin typeface="Calibri" panose="020F0502020204030204" pitchFamily="34" charset="0"/>
                 <a:ea typeface="Calibri" panose="020F0502020204030204" pitchFamily="34" charset="0"/>
                 <a:cs typeface="Times New Roman" panose="02020603050405020304" pitchFamily="18" charset="0"/>
@@ -10939,7 +10846,7 @@
               <a:t> e </a:t>
             </a:r>
             <a:r>
-              <a:rPr lang="pt-BR" sz="1600" u="sng" dirty="0" err="1">
+              <a:rPr lang="pt-BR" sz="2000" u="sng" dirty="0" err="1" smtClean="0">
                 <a:latin typeface="Calibri" panose="020F0502020204030204" pitchFamily="34" charset="0"/>
                 <a:ea typeface="Calibri" panose="020F0502020204030204" pitchFamily="34" charset="0"/>
                 <a:cs typeface="Times New Roman" panose="02020603050405020304" pitchFamily="18" charset="0"/>
@@ -10947,14 +10854,46 @@
               <a:t>Mathlab</a:t>
             </a:r>
             <a:r>
-              <a:rPr lang="pt-BR" sz="1600" dirty="0">
+              <a:rPr lang="pt-BR" sz="2000" dirty="0" smtClean="0">
+                <a:latin typeface="Calibri" panose="020F0502020204030204" pitchFamily="34" charset="0"/>
+                <a:ea typeface="Calibri" panose="020F0502020204030204" pitchFamily="34" charset="0"/>
+                <a:cs typeface="Times New Roman" panose="02020603050405020304" pitchFamily="18" charset="0"/>
+              </a:rPr>
+              <a:t> e </a:t>
+            </a:r>
+            <a:r>
+              <a:rPr lang="pt-BR" sz="2000" dirty="0">
+                <a:latin typeface="Calibri" panose="020F0502020204030204" pitchFamily="34" charset="0"/>
+                <a:ea typeface="Calibri" panose="020F0502020204030204" pitchFamily="34" charset="0"/>
+                <a:cs typeface="Times New Roman" panose="02020603050405020304" pitchFamily="18" charset="0"/>
+              </a:rPr>
+              <a:t>processamento de operações com </a:t>
+            </a:r>
+            <a:r>
+              <a:rPr lang="pt-BR" sz="2000" dirty="0" err="1">
+                <a:latin typeface="Calibri" panose="020F0502020204030204" pitchFamily="34" charset="0"/>
+                <a:ea typeface="Calibri" panose="020F0502020204030204" pitchFamily="34" charset="0"/>
+                <a:cs typeface="Times New Roman" panose="02020603050405020304" pitchFamily="18" charset="0"/>
+              </a:rPr>
+              <a:t>arrays</a:t>
+            </a:r>
+            <a:r>
+              <a:rPr lang="pt-BR" sz="2000" dirty="0">
+                <a:latin typeface="Calibri" panose="020F0502020204030204" pitchFamily="34" charset="0"/>
+                <a:ea typeface="Calibri" panose="020F0502020204030204" pitchFamily="34" charset="0"/>
+                <a:cs typeface="Times New Roman" panose="02020603050405020304" pitchFamily="18" charset="0"/>
+              </a:rPr>
+              <a:t> numéricos</a:t>
+            </a:r>
+            <a:r>
+              <a:rPr lang="pt-BR" sz="2000" dirty="0" smtClean="0">
                 <a:latin typeface="Calibri" panose="020F0502020204030204" pitchFamily="34" charset="0"/>
                 <a:ea typeface="Calibri" panose="020F0502020204030204" pitchFamily="34" charset="0"/>
                 <a:cs typeface="Times New Roman" panose="02020603050405020304" pitchFamily="18" charset="0"/>
               </a:rPr>
               <a:t>.</a:t>
             </a:r>
-            <a:endParaRPr lang="pt-BR" sz="1600" dirty="0"/>
+            <a:endParaRPr lang="pt-BR" sz="2000" dirty="0"/>
           </a:p>
         </p:txBody>
       </p:sp>
@@ -10966,7 +10905,7 @@
         </p:nvSpPr>
         <p:spPr>
           <a:xfrm>
-            <a:off x="5036177" y="1476145"/>
+            <a:off x="5036177" y="2364785"/>
             <a:ext cx="3198311" cy="369332"/>
           </a:xfrm>
           <a:prstGeom prst="rect">

</xml_diff>